<commit_message>
Added PAS slides to deck
</commit_message>
<xml_diff>
--- a/presentations/2025-04-DaVinci/Event/Burden Reduction - Approach for Achieving Conformance.pptx
+++ b/presentations/2025-04-DaVinci/Event/Burden Reduction - Approach for Achieving Conformance.pptx
@@ -5,7 +5,7 @@
     <p:sldMasterId id="2147483670" r:id="rId4"/>
   </p:sldMasterIdLst>
   <p:notesMasterIdLst>
-    <p:notesMasterId r:id="rId22"/>
+    <p:notesMasterId r:id="rId27"/>
   </p:notesMasterIdLst>
   <p:sldIdLst>
     <p:sldId id="256" r:id="rId5"/>
@@ -22,9 +22,14 @@
     <p:sldId id="263" r:id="rId16"/>
     <p:sldId id="265" r:id="rId17"/>
     <p:sldId id="264" r:id="rId18"/>
-    <p:sldId id="267" r:id="rId19"/>
-    <p:sldId id="266" r:id="rId20"/>
-    <p:sldId id="269" r:id="rId21"/>
+    <p:sldId id="277" r:id="rId19"/>
+    <p:sldId id="273" r:id="rId20"/>
+    <p:sldId id="274" r:id="rId21"/>
+    <p:sldId id="275" r:id="rId22"/>
+    <p:sldId id="276" r:id="rId23"/>
+    <p:sldId id="267" r:id="rId24"/>
+    <p:sldId id="266" r:id="rId25"/>
+    <p:sldId id="269" r:id="rId26"/>
   </p:sldIdLst>
   <p:sldSz cx="12192000" cy="6858000"/>
   <p:notesSz cx="7010400" cy="9296400"/>
@@ -5695,7 +5700,38 @@
           <a:bodyPr/>
           <a:lstStyle/>
           <a:p>
-            <a:endParaRPr lang="en-CA"/>
+            <a:r>
+              <a:rPr lang="en-CA" dirty="0"/>
+              <a:t>Primary objective:</a:t>
+            </a:r>
+          </a:p>
+          <a:p>
+            <a:pPr lvl="1"/>
+            <a:r>
+              <a:rPr lang="en-CA" dirty="0"/>
+              <a:t>Receive an answer to “do I have authorization to do this?”</a:t>
+            </a:r>
+          </a:p>
+          <a:p>
+            <a:r>
+              <a:rPr lang="en-CA" dirty="0"/>
+              <a:t>When combined with CRD and DTR, efficiency will be increased because providers will know if authorization is needed and what information is required to be included to make the authorization decision</a:t>
+            </a:r>
+          </a:p>
+          <a:p>
+            <a:endParaRPr lang="en-CA" dirty="0"/>
+          </a:p>
+          <a:p>
+            <a:r>
+              <a:rPr lang="en-CA" dirty="0"/>
+              <a:t>PAS IG provides a means for EHRs to send authorization requests using FHIR that will be converted to X12 278.</a:t>
+            </a:r>
+          </a:p>
+          <a:p>
+            <a:r>
+              <a:rPr lang="en-CA" dirty="0"/>
+              <a:t>CMS has granted an exception that allows providers and payers to use PAS FHIR Bundles without conversion to X12</a:t>
+            </a:r>
           </a:p>
         </p:txBody>
       </p:sp>
@@ -5720,7 +5756,10 @@
           <a:bodyPr/>
           <a:lstStyle/>
           <a:p>
-            <a:endParaRPr lang="en-CA"/>
+            <a:r>
+              <a:rPr lang="en-CA" dirty="0"/>
+              <a:t>PAS Regulatory Objectives</a:t>
+            </a:r>
           </a:p>
         </p:txBody>
       </p:sp>
@@ -5742,13 +5781,7 @@
   <p:cSld>
     <p:spTree>
       <p:nvGrpSpPr>
-        <p:cNvPr id="1" name="">
-          <a:extLst>
-            <a:ext uri="{FF2B5EF4-FFF2-40B4-BE49-F238E27FC236}">
-              <a16:creationId xmlns:a16="http://schemas.microsoft.com/office/drawing/2014/main" id="{36A5A747-EB81-EC2C-A840-2CFFFE97F5BF}"/>
-            </a:ext>
-          </a:extLst>
-        </p:cNvPr>
+        <p:cNvPr id="1" name=""/>
         <p:cNvGrpSpPr/>
         <p:nvPr/>
       </p:nvGrpSpPr>
@@ -5762,10 +5795,63 @@
       </p:grpSpPr>
       <p:sp>
         <p:nvSpPr>
-          <p:cNvPr id="5" name="Title 4">
-            <a:extLst>
-              <a:ext uri="{FF2B5EF4-FFF2-40B4-BE49-F238E27FC236}">
-                <a16:creationId xmlns:a16="http://schemas.microsoft.com/office/drawing/2014/main" id="{C83304B5-F4A3-E9E0-7BA4-B1800C085FAB}"/>
+          <p:cNvPr id="2" name="Text Placeholder 1">
+            <a:extLst>
+              <a:ext uri="{FF2B5EF4-FFF2-40B4-BE49-F238E27FC236}">
+                <a16:creationId xmlns:a16="http://schemas.microsoft.com/office/drawing/2014/main" id="{5379705A-88B6-581D-1475-D9D2D2E7B8DF}"/>
+              </a:ext>
+            </a:extLst>
+          </p:cNvPr>
+          <p:cNvSpPr>
+            <a:spLocks noGrp="1"/>
+          </p:cNvSpPr>
+          <p:nvPr>
+            <p:ph type="body" sz="quarter" idx="14"/>
+          </p:nvPr>
+        </p:nvSpPr>
+        <p:spPr/>
+        <p:txBody>
+          <a:bodyPr/>
+          <a:lstStyle/>
+          <a:p>
+            <a:r>
+              <a:rPr lang="en-US" dirty="0"/>
+              <a:t>Support the $submit for the initial request</a:t>
+            </a:r>
+          </a:p>
+          <a:p>
+            <a:r>
+              <a:rPr lang="en-US" dirty="0"/>
+              <a:t>Support the $submit for updated requests</a:t>
+            </a:r>
+          </a:p>
+          <a:p>
+            <a:r>
+              <a:rPr lang="en-US" dirty="0"/>
+              <a:t>Support Subscriptions to return update notifications to existing requests</a:t>
+            </a:r>
+          </a:p>
+          <a:p>
+            <a:r>
+              <a:rPr lang="en-US" dirty="0"/>
+              <a:t>Support $inquire to search </a:t>
+            </a:r>
+            <a:r>
+              <a:rPr lang="en-US"/>
+              <a:t>for requests</a:t>
+            </a:r>
+          </a:p>
+          <a:p>
+            <a:endParaRPr lang="en-US"/>
+          </a:p>
+        </p:txBody>
+      </p:sp>
+      <p:sp>
+        <p:nvSpPr>
+          <p:cNvPr id="3" name="Title 2">
+            <a:extLst>
+              <a:ext uri="{FF2B5EF4-FFF2-40B4-BE49-F238E27FC236}">
+                <a16:creationId xmlns:a16="http://schemas.microsoft.com/office/drawing/2014/main" id="{56B285F3-3ECC-6033-A510-F53D22991FCA}"/>
               </a:ext>
             </a:extLst>
           </p:cNvPr>
@@ -5782,8 +5868,8 @@
           <a:lstStyle/>
           <a:p>
             <a:r>
-              <a:rPr lang="en-CA" dirty="0"/>
-              <a:t>Summing Up</a:t>
+              <a:rPr lang="en-US" dirty="0"/>
+              <a:t>PAS Requirements</a:t>
             </a:r>
           </a:p>
         </p:txBody>
@@ -5793,7 +5879,7 @@
           <p:cNvPr id="4" name="Slide Number Placeholder 3">
             <a:extLst>
               <a:ext uri="{FF2B5EF4-FFF2-40B4-BE49-F238E27FC236}">
-                <a16:creationId xmlns:a16="http://schemas.microsoft.com/office/drawing/2014/main" id="{6EEDD107-E9C1-5720-EAC2-7341DC55CCD7}"/>
+                <a16:creationId xmlns:a16="http://schemas.microsoft.com/office/drawing/2014/main" id="{40577094-CF81-A734-5772-693B7750ABC3}"/>
               </a:ext>
             </a:extLst>
           </p:cNvPr>
@@ -5801,15 +5887,10 @@
             <a:spLocks noGrp="1"/>
           </p:cNvSpPr>
           <p:nvPr>
-            <p:ph type="sldNum" sz="quarter" idx="4294967295"/>
+            <p:ph type="sldNum" sz="quarter" idx="7"/>
           </p:nvPr>
         </p:nvSpPr>
-        <p:spPr>
-          <a:xfrm>
-            <a:off x="11610975" y="6489700"/>
-            <a:ext cx="581025" cy="365125"/>
-          </a:xfrm>
-        </p:spPr>
+        <p:spPr/>
         <p:txBody>
           <a:bodyPr/>
           <a:lstStyle/>
@@ -5825,7 +5906,7 @@
     </p:spTree>
     <p:extLst>
       <p:ext uri="{BB962C8B-B14F-4D97-AF65-F5344CB8AC3E}">
-        <p14:creationId xmlns:p14="http://schemas.microsoft.com/office/powerpoint/2010/main" val="3905462553"/>
+        <p14:creationId xmlns:p14="http://schemas.microsoft.com/office/powerpoint/2010/main" val="1821740333"/>
       </p:ext>
     </p:extLst>
   </p:cSld>
@@ -5840,13 +5921,7 @@
   <p:cSld>
     <p:spTree>
       <p:nvGrpSpPr>
-        <p:cNvPr id="1" name="">
-          <a:extLst>
-            <a:ext uri="{FF2B5EF4-FFF2-40B4-BE49-F238E27FC236}">
-              <a16:creationId xmlns:a16="http://schemas.microsoft.com/office/drawing/2014/main" id="{9E43AE42-58F9-6F91-0D54-42D86B5F70C6}"/>
-            </a:ext>
-          </a:extLst>
-        </p:cNvPr>
+        <p:cNvPr id="1" name=""/>
         <p:cNvGrpSpPr/>
         <p:nvPr/>
       </p:nvGrpSpPr>
@@ -5860,10 +5935,10 @@
       </p:grpSpPr>
       <p:sp>
         <p:nvSpPr>
-          <p:cNvPr id="5" name="Text Placeholder 4">
-            <a:extLst>
-              <a:ext uri="{FF2B5EF4-FFF2-40B4-BE49-F238E27FC236}">
-                <a16:creationId xmlns:a16="http://schemas.microsoft.com/office/drawing/2014/main" id="{C87826AC-6C80-5ABE-9094-D0F17113C51D}"/>
+          <p:cNvPr id="2" name="Text Placeholder 1">
+            <a:extLst>
+              <a:ext uri="{FF2B5EF4-FFF2-40B4-BE49-F238E27FC236}">
+                <a16:creationId xmlns:a16="http://schemas.microsoft.com/office/drawing/2014/main" id="{A737E6A7-152A-B93C-085A-75F9581F8144}"/>
               </a:ext>
             </a:extLst>
           </p:cNvPr>
@@ -5880,36 +5955,65 @@
           <a:lstStyle/>
           <a:p>
             <a:r>
-              <a:rPr lang="en-CA" dirty="0"/>
-              <a:t>You don’t have to build everything in all the guides to comply</a:t>
-            </a:r>
-          </a:p>
-          <a:p>
-            <a:r>
-              <a:rPr lang="en-CA" dirty="0"/>
-              <a:t>You can (and should) build in parallel</a:t>
-            </a:r>
-          </a:p>
-          <a:p>
-            <a:r>
-              <a:rPr lang="en-CA" dirty="0"/>
-              <a:t>This is complex – so start early</a:t>
-            </a:r>
-          </a:p>
-          <a:p>
-            <a:r>
-              <a:rPr lang="en-CA" dirty="0"/>
-              <a:t>Build capability over time</a:t>
+              <a:rPr lang="en-US" dirty="0"/>
+              <a:t>The $submit operation is used to send a Prior Authorization request bundle that includes the Claim Request and any referenced resources for processing.</a:t>
+            </a:r>
+          </a:p>
+          <a:p>
+            <a:r>
+              <a:rPr lang="en-US" dirty="0"/>
+              <a:t>The input is a PAS Claim Request Bundle and the output is a PAS Claim Response Bundle or an </a:t>
+            </a:r>
+            <a:r>
+              <a:rPr lang="en-US" dirty="0" err="1"/>
+              <a:t>OperationOutcome</a:t>
+            </a:r>
+            <a:r>
+              <a:rPr lang="en-US" dirty="0"/>
+              <a:t> resource.</a:t>
+            </a:r>
+          </a:p>
+          <a:p>
+            <a:r>
+              <a:rPr lang="en-US" dirty="0"/>
+              <a:t>The response will indicate the status of the authorization of each item:</a:t>
+            </a:r>
+          </a:p>
+          <a:p>
+            <a:pPr lvl="1"/>
+            <a:r>
+              <a:rPr lang="en-US" dirty="0"/>
+              <a:t>Successful – the requested item has been approved</a:t>
+            </a:r>
+          </a:p>
+          <a:p>
+            <a:pPr lvl="1"/>
+            <a:r>
+              <a:rPr lang="en-US" dirty="0"/>
+              <a:t>Denied – the requested item has been denied</a:t>
+            </a:r>
+          </a:p>
+          <a:p>
+            <a:pPr lvl="1"/>
+            <a:r>
+              <a:rPr lang="en-US" dirty="0"/>
+              <a:t>Pended – the requested item is undergoing review</a:t>
+            </a:r>
+          </a:p>
+          <a:p>
+            <a:r>
+              <a:rPr lang="en-US" dirty="0"/>
+              <a:t>It is also possible for the response to return different items than what was requested.</a:t>
             </a:r>
           </a:p>
         </p:txBody>
       </p:sp>
       <p:sp>
         <p:nvSpPr>
-          <p:cNvPr id="4" name="Title 3">
-            <a:extLst>
-              <a:ext uri="{FF2B5EF4-FFF2-40B4-BE49-F238E27FC236}">
-                <a16:creationId xmlns:a16="http://schemas.microsoft.com/office/drawing/2014/main" id="{FA2E87CD-338A-BA53-BBF4-9C52BF39DBAB}"/>
+          <p:cNvPr id="3" name="Title 2">
+            <a:extLst>
+              <a:ext uri="{FF2B5EF4-FFF2-40B4-BE49-F238E27FC236}">
+                <a16:creationId xmlns:a16="http://schemas.microsoft.com/office/drawing/2014/main" id="{50998693-D4BE-18D9-8F1D-54EBD204758E}"/>
               </a:ext>
             </a:extLst>
           </p:cNvPr>
@@ -5926,16 +6030,45 @@
           <a:lstStyle/>
           <a:p>
             <a:r>
-              <a:rPr lang="en-CA" dirty="0"/>
-              <a:t>Key take-aways</a:t>
-            </a:r>
+              <a:rPr lang="en-US" dirty="0"/>
+              <a:t>PAS Claim $submit</a:t>
+            </a:r>
+          </a:p>
+        </p:txBody>
+      </p:sp>
+      <p:sp>
+        <p:nvSpPr>
+          <p:cNvPr id="4" name="Slide Number Placeholder 3">
+            <a:extLst>
+              <a:ext uri="{FF2B5EF4-FFF2-40B4-BE49-F238E27FC236}">
+                <a16:creationId xmlns:a16="http://schemas.microsoft.com/office/drawing/2014/main" id="{D9D1FA6A-5FB0-B083-7968-E4C4200C2F48}"/>
+              </a:ext>
+            </a:extLst>
+          </p:cNvPr>
+          <p:cNvSpPr>
+            <a:spLocks noGrp="1"/>
+          </p:cNvSpPr>
+          <p:nvPr>
+            <p:ph type="sldNum" sz="quarter" idx="7"/>
+          </p:nvPr>
+        </p:nvSpPr>
+        <p:spPr/>
+        <p:txBody>
+          <a:bodyPr/>
+          <a:lstStyle/>
+          <a:p>
+            <a:fld id="{B6F15528-21DE-4FAA-801E-634DDDAF4B2B}" type="slidenum">
+              <a:rPr lang="en-CA" smtClean="0"/>
+              <a:t>16</a:t>
+            </a:fld>
+            <a:endParaRPr lang="en-CA"/>
           </a:p>
         </p:txBody>
       </p:sp>
     </p:spTree>
     <p:extLst>
       <p:ext uri="{BB962C8B-B14F-4D97-AF65-F5344CB8AC3E}">
-        <p14:creationId xmlns:p14="http://schemas.microsoft.com/office/powerpoint/2010/main" val="461002858"/>
+        <p14:creationId xmlns:p14="http://schemas.microsoft.com/office/powerpoint/2010/main" val="2017393717"/>
       </p:ext>
     </p:extLst>
   </p:cSld>
@@ -5950,13 +6083,7 @@
   <p:cSld>
     <p:spTree>
       <p:nvGrpSpPr>
-        <p:cNvPr id="1" name="">
-          <a:extLst>
-            <a:ext uri="{FF2B5EF4-FFF2-40B4-BE49-F238E27FC236}">
-              <a16:creationId xmlns:a16="http://schemas.microsoft.com/office/drawing/2014/main" id="{4A267E3C-FE76-ADDB-FB9F-84D05EB68039}"/>
-            </a:ext>
-          </a:extLst>
-        </p:cNvPr>
+        <p:cNvPr id="1" name=""/>
         <p:cNvGrpSpPr/>
         <p:nvPr/>
       </p:nvGrpSpPr>
@@ -5970,10 +6097,53 @@
       </p:grpSpPr>
       <p:sp>
         <p:nvSpPr>
-          <p:cNvPr id="5" name="Title 4">
-            <a:extLst>
-              <a:ext uri="{FF2B5EF4-FFF2-40B4-BE49-F238E27FC236}">
-                <a16:creationId xmlns:a16="http://schemas.microsoft.com/office/drawing/2014/main" id="{7465A86E-DF90-DB76-AB33-CA55E772835B}"/>
+          <p:cNvPr id="2" name="Text Placeholder 1">
+            <a:extLst>
+              <a:ext uri="{FF2B5EF4-FFF2-40B4-BE49-F238E27FC236}">
+                <a16:creationId xmlns:a16="http://schemas.microsoft.com/office/drawing/2014/main" id="{FDE9F2B3-633C-9640-EE41-BEC2DE4FAB60}"/>
+              </a:ext>
+            </a:extLst>
+          </p:cNvPr>
+          <p:cNvSpPr>
+            <a:spLocks noGrp="1"/>
+          </p:cNvSpPr>
+          <p:nvPr>
+            <p:ph type="body" sz="quarter" idx="14"/>
+          </p:nvPr>
+        </p:nvSpPr>
+        <p:spPr/>
+        <p:txBody>
+          <a:bodyPr/>
+          <a:lstStyle/>
+          <a:p>
+            <a:r>
+              <a:rPr lang="en-US" dirty="0"/>
+              <a:t>If the response returns a pended item, then the provider system is expected to use FHIR Subscriptions to find out when the decision has been made.</a:t>
+            </a:r>
+          </a:p>
+          <a:p>
+            <a:r>
+              <a:rPr lang="en-US" dirty="0"/>
+              <a:t>The subscription is created at the level of the requesting provider organization and thus handles all requests made by that organization.</a:t>
+            </a:r>
+          </a:p>
+          <a:p>
+            <a:r>
+              <a:rPr lang="en-US" dirty="0"/>
+              <a:t>When the Prior Authorization response has changed, either to be approved, to be denied, or to require more information, the notification will be sent to the provider organization.</a:t>
+            </a:r>
+          </a:p>
+          <a:p>
+            <a:endParaRPr lang="en-US" dirty="0"/>
+          </a:p>
+        </p:txBody>
+      </p:sp>
+      <p:sp>
+        <p:nvSpPr>
+          <p:cNvPr id="3" name="Title 2">
+            <a:extLst>
+              <a:ext uri="{FF2B5EF4-FFF2-40B4-BE49-F238E27FC236}">
+                <a16:creationId xmlns:a16="http://schemas.microsoft.com/office/drawing/2014/main" id="{307E0247-6B50-B5ED-FD6B-E611CD6011A7}"/>
               </a:ext>
             </a:extLst>
           </p:cNvPr>
@@ -5990,8 +6160,8 @@
           <a:lstStyle/>
           <a:p>
             <a:r>
-              <a:rPr lang="en-CA" dirty="0"/>
-              <a:t>Questions?</a:t>
+              <a:rPr lang="en-US" dirty="0"/>
+              <a:t>Subscriptions</a:t>
             </a:r>
           </a:p>
         </p:txBody>
@@ -6001,7 +6171,7 @@
           <p:cNvPr id="4" name="Slide Number Placeholder 3">
             <a:extLst>
               <a:ext uri="{FF2B5EF4-FFF2-40B4-BE49-F238E27FC236}">
-                <a16:creationId xmlns:a16="http://schemas.microsoft.com/office/drawing/2014/main" id="{FD9E6229-00C6-9485-93D6-6EE66CE654D1}"/>
+                <a16:creationId xmlns:a16="http://schemas.microsoft.com/office/drawing/2014/main" id="{8DFCABE2-88D7-1D2B-0CB8-AEEC89C895FB}"/>
               </a:ext>
             </a:extLst>
           </p:cNvPr>
@@ -6009,15 +6179,10 @@
             <a:spLocks noGrp="1"/>
           </p:cNvSpPr>
           <p:nvPr>
-            <p:ph type="sldNum" sz="quarter" idx="4294967295"/>
+            <p:ph type="sldNum" sz="quarter" idx="7"/>
           </p:nvPr>
         </p:nvSpPr>
-        <p:spPr>
-          <a:xfrm>
-            <a:off x="11610975" y="6489700"/>
-            <a:ext cx="581025" cy="365125"/>
-          </a:xfrm>
-        </p:spPr>
+        <p:spPr/>
         <p:txBody>
           <a:bodyPr/>
           <a:lstStyle/>
@@ -6033,7 +6198,317 @@
     </p:spTree>
     <p:extLst>
       <p:ext uri="{BB962C8B-B14F-4D97-AF65-F5344CB8AC3E}">
-        <p14:creationId xmlns:p14="http://schemas.microsoft.com/office/powerpoint/2010/main" val="805596329"/>
+        <p14:creationId xmlns:p14="http://schemas.microsoft.com/office/powerpoint/2010/main" val="3487917906"/>
+      </p:ext>
+    </p:extLst>
+  </p:cSld>
+  <p:clrMapOvr>
+    <a:masterClrMapping/>
+  </p:clrMapOvr>
+</p:sld>
+</file>
+
+<file path=ppt/slides/slide18.xml><?xml version="1.0" encoding="utf-8"?>
+<p:sld xmlns:a="http://schemas.openxmlformats.org/drawingml/2006/main" xmlns:r="http://schemas.openxmlformats.org/officeDocument/2006/relationships" xmlns:p="http://schemas.openxmlformats.org/presentationml/2006/main">
+  <p:cSld>
+    <p:spTree>
+      <p:nvGrpSpPr>
+        <p:cNvPr id="1" name=""/>
+        <p:cNvGrpSpPr/>
+        <p:nvPr/>
+      </p:nvGrpSpPr>
+      <p:grpSpPr>
+        <a:xfrm>
+          <a:off x="0" y="0"/>
+          <a:ext cx="0" cy="0"/>
+          <a:chOff x="0" y="0"/>
+          <a:chExt cx="0" cy="0"/>
+        </a:xfrm>
+      </p:grpSpPr>
+      <p:sp>
+        <p:nvSpPr>
+          <p:cNvPr id="2" name="Text Placeholder 1">
+            <a:extLst>
+              <a:ext uri="{FF2B5EF4-FFF2-40B4-BE49-F238E27FC236}">
+                <a16:creationId xmlns:a16="http://schemas.microsoft.com/office/drawing/2014/main" id="{1C813303-BD95-B0C9-85FE-98B75F95E295}"/>
+              </a:ext>
+            </a:extLst>
+          </p:cNvPr>
+          <p:cNvSpPr>
+            <a:spLocks noGrp="1"/>
+          </p:cNvSpPr>
+          <p:nvPr>
+            <p:ph type="body" sz="quarter" idx="14"/>
+          </p:nvPr>
+        </p:nvSpPr>
+        <p:spPr/>
+        <p:txBody>
+          <a:bodyPr/>
+          <a:lstStyle/>
+          <a:p>
+            <a:r>
+              <a:rPr lang="en-US" dirty="0"/>
+              <a:t>Non-Submitting systems are not able to subscribe to Prior Authorizations.</a:t>
+            </a:r>
+          </a:p>
+          <a:p>
+            <a:r>
+              <a:rPr lang="en-US" dirty="0"/>
+              <a:t>There is a use case for non-submitting systems to find out about prior authorizations.</a:t>
+            </a:r>
+          </a:p>
+          <a:p>
+            <a:r>
+              <a:rPr lang="en-US" dirty="0"/>
+              <a:t>The $inquire operation supports searching for authorizations by example.</a:t>
+            </a:r>
+          </a:p>
+          <a:p>
+            <a:r>
+              <a:rPr lang="en-US" dirty="0"/>
+              <a:t>The incoming parameter is a FHIR Claim Inquiry Bundle which provides the items intended to match existing authorization requests:</a:t>
+            </a:r>
+          </a:p>
+          <a:p>
+            <a:pPr lvl="1"/>
+            <a:r>
+              <a:rPr lang="en-US" dirty="0"/>
+              <a:t>Requesting provider organization</a:t>
+            </a:r>
+          </a:p>
+          <a:p>
+            <a:pPr lvl="1"/>
+            <a:r>
+              <a:rPr lang="en-US" dirty="0"/>
+              <a:t>Payer organization</a:t>
+            </a:r>
+          </a:p>
+          <a:p>
+            <a:pPr lvl="1"/>
+            <a:r>
+              <a:rPr lang="en-US" dirty="0"/>
+              <a:t>Patient</a:t>
+            </a:r>
+          </a:p>
+          <a:p>
+            <a:pPr lvl="1"/>
+            <a:r>
+              <a:rPr lang="en-US" dirty="0"/>
+              <a:t>Other fields as needed</a:t>
+            </a:r>
+          </a:p>
+        </p:txBody>
+      </p:sp>
+      <p:sp>
+        <p:nvSpPr>
+          <p:cNvPr id="3" name="Title 2">
+            <a:extLst>
+              <a:ext uri="{FF2B5EF4-FFF2-40B4-BE49-F238E27FC236}">
+                <a16:creationId xmlns:a16="http://schemas.microsoft.com/office/drawing/2014/main" id="{9EADEA4A-A7AB-45F9-B483-35B4F8224732}"/>
+              </a:ext>
+            </a:extLst>
+          </p:cNvPr>
+          <p:cNvSpPr>
+            <a:spLocks noGrp="1"/>
+          </p:cNvSpPr>
+          <p:nvPr>
+            <p:ph type="title"/>
+          </p:nvPr>
+        </p:nvSpPr>
+        <p:spPr/>
+        <p:txBody>
+          <a:bodyPr/>
+          <a:lstStyle/>
+          <a:p>
+            <a:r>
+              <a:rPr lang="en-US" dirty="0"/>
+              <a:t>Prior Authorization Inquiries</a:t>
+            </a:r>
+          </a:p>
+        </p:txBody>
+      </p:sp>
+      <p:sp>
+        <p:nvSpPr>
+          <p:cNvPr id="4" name="Slide Number Placeholder 3">
+            <a:extLst>
+              <a:ext uri="{FF2B5EF4-FFF2-40B4-BE49-F238E27FC236}">
+                <a16:creationId xmlns:a16="http://schemas.microsoft.com/office/drawing/2014/main" id="{3AEB1BB1-3A67-4C42-BBBB-019C7DD5CE37}"/>
+              </a:ext>
+            </a:extLst>
+          </p:cNvPr>
+          <p:cNvSpPr>
+            <a:spLocks noGrp="1"/>
+          </p:cNvSpPr>
+          <p:nvPr>
+            <p:ph type="sldNum" sz="quarter" idx="7"/>
+          </p:nvPr>
+        </p:nvSpPr>
+        <p:spPr/>
+        <p:txBody>
+          <a:bodyPr/>
+          <a:lstStyle/>
+          <a:p>
+            <a:fld id="{B6F15528-21DE-4FAA-801E-634DDDAF4B2B}" type="slidenum">
+              <a:rPr lang="en-CA" smtClean="0"/>
+              <a:t>18</a:t>
+            </a:fld>
+            <a:endParaRPr lang="en-CA"/>
+          </a:p>
+        </p:txBody>
+      </p:sp>
+    </p:spTree>
+    <p:extLst>
+      <p:ext uri="{BB962C8B-B14F-4D97-AF65-F5344CB8AC3E}">
+        <p14:creationId xmlns:p14="http://schemas.microsoft.com/office/powerpoint/2010/main" val="3564063120"/>
+      </p:ext>
+    </p:extLst>
+  </p:cSld>
+  <p:clrMapOvr>
+    <a:masterClrMapping/>
+  </p:clrMapOvr>
+</p:sld>
+</file>
+
+<file path=ppt/slides/slide19.xml><?xml version="1.0" encoding="utf-8"?>
+<p:sld xmlns:a="http://schemas.openxmlformats.org/drawingml/2006/main" xmlns:r="http://schemas.openxmlformats.org/officeDocument/2006/relationships" xmlns:p="http://schemas.openxmlformats.org/presentationml/2006/main">
+  <p:cSld>
+    <p:spTree>
+      <p:nvGrpSpPr>
+        <p:cNvPr id="1" name=""/>
+        <p:cNvGrpSpPr/>
+        <p:nvPr/>
+      </p:nvGrpSpPr>
+      <p:grpSpPr>
+        <a:xfrm>
+          <a:off x="0" y="0"/>
+          <a:ext cx="0" cy="0"/>
+          <a:chOff x="0" y="0"/>
+          <a:chExt cx="0" cy="0"/>
+        </a:xfrm>
+      </p:grpSpPr>
+      <p:sp>
+        <p:nvSpPr>
+          <p:cNvPr id="2" name="Text Placeholder 1">
+            <a:extLst>
+              <a:ext uri="{FF2B5EF4-FFF2-40B4-BE49-F238E27FC236}">
+                <a16:creationId xmlns:a16="http://schemas.microsoft.com/office/drawing/2014/main" id="{8ED0F328-2538-C84D-D533-D3566C5F7960}"/>
+              </a:ext>
+            </a:extLst>
+          </p:cNvPr>
+          <p:cNvSpPr>
+            <a:spLocks noGrp="1"/>
+          </p:cNvSpPr>
+          <p:nvPr>
+            <p:ph type="body" sz="quarter" idx="14"/>
+          </p:nvPr>
+        </p:nvSpPr>
+        <p:spPr/>
+        <p:txBody>
+          <a:bodyPr/>
+          <a:lstStyle/>
+          <a:p>
+            <a:r>
+              <a:rPr lang="en-US" dirty="0"/>
+              <a:t>In some cases, the prior authorization needs to be updated after the request was submitted:</a:t>
+            </a:r>
+          </a:p>
+          <a:p>
+            <a:pPr lvl="1"/>
+            <a:r>
+              <a:rPr lang="en-US" dirty="0"/>
+              <a:t>Change to the services needed</a:t>
+            </a:r>
+          </a:p>
+          <a:p>
+            <a:pPr lvl="1"/>
+            <a:r>
+              <a:rPr lang="en-US" dirty="0"/>
+              <a:t>Timeframe over which the service is provided</a:t>
+            </a:r>
+          </a:p>
+          <a:p>
+            <a:pPr lvl="1"/>
+            <a:r>
+              <a:rPr lang="en-US" dirty="0"/>
+              <a:t>Quantity of service or product</a:t>
+            </a:r>
+          </a:p>
+          <a:p>
+            <a:pPr lvl="1"/>
+            <a:r>
+              <a:rPr lang="en-US" dirty="0"/>
+              <a:t>Elimination of the need for a given service</a:t>
+            </a:r>
+          </a:p>
+          <a:p>
+            <a:r>
+              <a:rPr lang="en-US" dirty="0"/>
+              <a:t>A FHIR Claim Update request bundle is submitted with the $submit operation.  This bundle is converted into an X12 278 update.</a:t>
+            </a:r>
+          </a:p>
+        </p:txBody>
+      </p:sp>
+      <p:sp>
+        <p:nvSpPr>
+          <p:cNvPr id="3" name="Title 2">
+            <a:extLst>
+              <a:ext uri="{FF2B5EF4-FFF2-40B4-BE49-F238E27FC236}">
+                <a16:creationId xmlns:a16="http://schemas.microsoft.com/office/drawing/2014/main" id="{32742139-24DE-683D-2CF0-EC279DBFC8A2}"/>
+              </a:ext>
+            </a:extLst>
+          </p:cNvPr>
+          <p:cNvSpPr>
+            <a:spLocks noGrp="1"/>
+          </p:cNvSpPr>
+          <p:nvPr>
+            <p:ph type="title"/>
+          </p:nvPr>
+        </p:nvSpPr>
+        <p:spPr/>
+        <p:txBody>
+          <a:bodyPr/>
+          <a:lstStyle/>
+          <a:p>
+            <a:r>
+              <a:rPr lang="en-US" dirty="0"/>
+              <a:t>Prior Authorization Updates</a:t>
+            </a:r>
+          </a:p>
+        </p:txBody>
+      </p:sp>
+      <p:sp>
+        <p:nvSpPr>
+          <p:cNvPr id="4" name="Slide Number Placeholder 3">
+            <a:extLst>
+              <a:ext uri="{FF2B5EF4-FFF2-40B4-BE49-F238E27FC236}">
+                <a16:creationId xmlns:a16="http://schemas.microsoft.com/office/drawing/2014/main" id="{9028E8F4-65EE-1C76-5345-B864EADA4AA2}"/>
+              </a:ext>
+            </a:extLst>
+          </p:cNvPr>
+          <p:cNvSpPr>
+            <a:spLocks noGrp="1"/>
+          </p:cNvSpPr>
+          <p:nvPr>
+            <p:ph type="sldNum" sz="quarter" idx="7"/>
+          </p:nvPr>
+        </p:nvSpPr>
+        <p:spPr/>
+        <p:txBody>
+          <a:bodyPr/>
+          <a:lstStyle/>
+          <a:p>
+            <a:fld id="{B6F15528-21DE-4FAA-801E-634DDDAF4B2B}" type="slidenum">
+              <a:rPr lang="en-CA" smtClean="0"/>
+              <a:t>19</a:t>
+            </a:fld>
+            <a:endParaRPr lang="en-CA"/>
+          </a:p>
+        </p:txBody>
+      </p:sp>
+    </p:spTree>
+    <p:extLst>
+      <p:ext uri="{BB962C8B-B14F-4D97-AF65-F5344CB8AC3E}">
+        <p14:creationId xmlns:p14="http://schemas.microsoft.com/office/powerpoint/2010/main" val="1155457930"/>
       </p:ext>
     </p:extLst>
   </p:cSld>
@@ -6117,6 +6592,312 @@
     <p:extLst>
       <p:ext uri="{BB962C8B-B14F-4D97-AF65-F5344CB8AC3E}">
         <p14:creationId xmlns:p14="http://schemas.microsoft.com/office/powerpoint/2010/main" val="2160487977"/>
+      </p:ext>
+    </p:extLst>
+  </p:cSld>
+  <p:clrMapOvr>
+    <a:masterClrMapping/>
+  </p:clrMapOvr>
+</p:sld>
+</file>
+
+<file path=ppt/slides/slide20.xml><?xml version="1.0" encoding="utf-8"?>
+<p:sld xmlns:a="http://schemas.openxmlformats.org/drawingml/2006/main" xmlns:r="http://schemas.openxmlformats.org/officeDocument/2006/relationships" xmlns:p="http://schemas.openxmlformats.org/presentationml/2006/main">
+  <p:cSld>
+    <p:spTree>
+      <p:nvGrpSpPr>
+        <p:cNvPr id="1" name="">
+          <a:extLst>
+            <a:ext uri="{FF2B5EF4-FFF2-40B4-BE49-F238E27FC236}">
+              <a16:creationId xmlns:a16="http://schemas.microsoft.com/office/drawing/2014/main" id="{36A5A747-EB81-EC2C-A840-2CFFFE97F5BF}"/>
+            </a:ext>
+          </a:extLst>
+        </p:cNvPr>
+        <p:cNvGrpSpPr/>
+        <p:nvPr/>
+      </p:nvGrpSpPr>
+      <p:grpSpPr>
+        <a:xfrm>
+          <a:off x="0" y="0"/>
+          <a:ext cx="0" cy="0"/>
+          <a:chOff x="0" y="0"/>
+          <a:chExt cx="0" cy="0"/>
+        </a:xfrm>
+      </p:grpSpPr>
+      <p:sp>
+        <p:nvSpPr>
+          <p:cNvPr id="5" name="Title 4">
+            <a:extLst>
+              <a:ext uri="{FF2B5EF4-FFF2-40B4-BE49-F238E27FC236}">
+                <a16:creationId xmlns:a16="http://schemas.microsoft.com/office/drawing/2014/main" id="{C83304B5-F4A3-E9E0-7BA4-B1800C085FAB}"/>
+              </a:ext>
+            </a:extLst>
+          </p:cNvPr>
+          <p:cNvSpPr>
+            <a:spLocks noGrp="1"/>
+          </p:cNvSpPr>
+          <p:nvPr>
+            <p:ph type="title"/>
+          </p:nvPr>
+        </p:nvSpPr>
+        <p:spPr/>
+        <p:txBody>
+          <a:bodyPr/>
+          <a:lstStyle/>
+          <a:p>
+            <a:r>
+              <a:rPr lang="en-CA" dirty="0"/>
+              <a:t>Summing Up</a:t>
+            </a:r>
+          </a:p>
+        </p:txBody>
+      </p:sp>
+      <p:sp>
+        <p:nvSpPr>
+          <p:cNvPr id="4" name="Slide Number Placeholder 3">
+            <a:extLst>
+              <a:ext uri="{FF2B5EF4-FFF2-40B4-BE49-F238E27FC236}">
+                <a16:creationId xmlns:a16="http://schemas.microsoft.com/office/drawing/2014/main" id="{6EEDD107-E9C1-5720-EAC2-7341DC55CCD7}"/>
+              </a:ext>
+            </a:extLst>
+          </p:cNvPr>
+          <p:cNvSpPr>
+            <a:spLocks noGrp="1"/>
+          </p:cNvSpPr>
+          <p:nvPr>
+            <p:ph type="sldNum" sz="quarter" idx="4294967295"/>
+          </p:nvPr>
+        </p:nvSpPr>
+        <p:spPr>
+          <a:xfrm>
+            <a:off x="11610975" y="6489700"/>
+            <a:ext cx="581025" cy="365125"/>
+          </a:xfrm>
+        </p:spPr>
+        <p:txBody>
+          <a:bodyPr/>
+          <a:lstStyle/>
+          <a:p>
+            <a:fld id="{B6F15528-21DE-4FAA-801E-634DDDAF4B2B}" type="slidenum">
+              <a:rPr lang="en-CA" smtClean="0"/>
+              <a:t>20</a:t>
+            </a:fld>
+            <a:endParaRPr lang="en-CA"/>
+          </a:p>
+        </p:txBody>
+      </p:sp>
+    </p:spTree>
+    <p:extLst>
+      <p:ext uri="{BB962C8B-B14F-4D97-AF65-F5344CB8AC3E}">
+        <p14:creationId xmlns:p14="http://schemas.microsoft.com/office/powerpoint/2010/main" val="3905462553"/>
+      </p:ext>
+    </p:extLst>
+  </p:cSld>
+  <p:clrMapOvr>
+    <a:masterClrMapping/>
+  </p:clrMapOvr>
+</p:sld>
+</file>
+
+<file path=ppt/slides/slide21.xml><?xml version="1.0" encoding="utf-8"?>
+<p:sld xmlns:a="http://schemas.openxmlformats.org/drawingml/2006/main" xmlns:r="http://schemas.openxmlformats.org/officeDocument/2006/relationships" xmlns:p="http://schemas.openxmlformats.org/presentationml/2006/main">
+  <p:cSld>
+    <p:spTree>
+      <p:nvGrpSpPr>
+        <p:cNvPr id="1" name="">
+          <a:extLst>
+            <a:ext uri="{FF2B5EF4-FFF2-40B4-BE49-F238E27FC236}">
+              <a16:creationId xmlns:a16="http://schemas.microsoft.com/office/drawing/2014/main" id="{9E43AE42-58F9-6F91-0D54-42D86B5F70C6}"/>
+            </a:ext>
+          </a:extLst>
+        </p:cNvPr>
+        <p:cNvGrpSpPr/>
+        <p:nvPr/>
+      </p:nvGrpSpPr>
+      <p:grpSpPr>
+        <a:xfrm>
+          <a:off x="0" y="0"/>
+          <a:ext cx="0" cy="0"/>
+          <a:chOff x="0" y="0"/>
+          <a:chExt cx="0" cy="0"/>
+        </a:xfrm>
+      </p:grpSpPr>
+      <p:sp>
+        <p:nvSpPr>
+          <p:cNvPr id="5" name="Text Placeholder 4">
+            <a:extLst>
+              <a:ext uri="{FF2B5EF4-FFF2-40B4-BE49-F238E27FC236}">
+                <a16:creationId xmlns:a16="http://schemas.microsoft.com/office/drawing/2014/main" id="{C87826AC-6C80-5ABE-9094-D0F17113C51D}"/>
+              </a:ext>
+            </a:extLst>
+          </p:cNvPr>
+          <p:cNvSpPr>
+            <a:spLocks noGrp="1"/>
+          </p:cNvSpPr>
+          <p:nvPr>
+            <p:ph type="body" sz="quarter" idx="14"/>
+          </p:nvPr>
+        </p:nvSpPr>
+        <p:spPr/>
+        <p:txBody>
+          <a:bodyPr/>
+          <a:lstStyle/>
+          <a:p>
+            <a:r>
+              <a:rPr lang="en-CA" dirty="0"/>
+              <a:t>You don’t have to build everything in all the guides to comply</a:t>
+            </a:r>
+          </a:p>
+          <a:p>
+            <a:r>
+              <a:rPr lang="en-CA" dirty="0"/>
+              <a:t>You can (and should) build in parallel</a:t>
+            </a:r>
+          </a:p>
+          <a:p>
+            <a:r>
+              <a:rPr lang="en-CA" dirty="0"/>
+              <a:t>This is complex – so start early</a:t>
+            </a:r>
+          </a:p>
+          <a:p>
+            <a:r>
+              <a:rPr lang="en-CA" dirty="0"/>
+              <a:t>Build capability over time</a:t>
+            </a:r>
+          </a:p>
+        </p:txBody>
+      </p:sp>
+      <p:sp>
+        <p:nvSpPr>
+          <p:cNvPr id="4" name="Title 3">
+            <a:extLst>
+              <a:ext uri="{FF2B5EF4-FFF2-40B4-BE49-F238E27FC236}">
+                <a16:creationId xmlns:a16="http://schemas.microsoft.com/office/drawing/2014/main" id="{FA2E87CD-338A-BA53-BBF4-9C52BF39DBAB}"/>
+              </a:ext>
+            </a:extLst>
+          </p:cNvPr>
+          <p:cNvSpPr>
+            <a:spLocks noGrp="1"/>
+          </p:cNvSpPr>
+          <p:nvPr>
+            <p:ph type="title"/>
+          </p:nvPr>
+        </p:nvSpPr>
+        <p:spPr/>
+        <p:txBody>
+          <a:bodyPr/>
+          <a:lstStyle/>
+          <a:p>
+            <a:r>
+              <a:rPr lang="en-CA" dirty="0"/>
+              <a:t>Key take-aways</a:t>
+            </a:r>
+          </a:p>
+        </p:txBody>
+      </p:sp>
+    </p:spTree>
+    <p:extLst>
+      <p:ext uri="{BB962C8B-B14F-4D97-AF65-F5344CB8AC3E}">
+        <p14:creationId xmlns:p14="http://schemas.microsoft.com/office/powerpoint/2010/main" val="461002858"/>
+      </p:ext>
+    </p:extLst>
+  </p:cSld>
+  <p:clrMapOvr>
+    <a:masterClrMapping/>
+  </p:clrMapOvr>
+</p:sld>
+</file>
+
+<file path=ppt/slides/slide22.xml><?xml version="1.0" encoding="utf-8"?>
+<p:sld xmlns:a="http://schemas.openxmlformats.org/drawingml/2006/main" xmlns:r="http://schemas.openxmlformats.org/officeDocument/2006/relationships" xmlns:p="http://schemas.openxmlformats.org/presentationml/2006/main">
+  <p:cSld>
+    <p:spTree>
+      <p:nvGrpSpPr>
+        <p:cNvPr id="1" name="">
+          <a:extLst>
+            <a:ext uri="{FF2B5EF4-FFF2-40B4-BE49-F238E27FC236}">
+              <a16:creationId xmlns:a16="http://schemas.microsoft.com/office/drawing/2014/main" id="{4A267E3C-FE76-ADDB-FB9F-84D05EB68039}"/>
+            </a:ext>
+          </a:extLst>
+        </p:cNvPr>
+        <p:cNvGrpSpPr/>
+        <p:nvPr/>
+      </p:nvGrpSpPr>
+      <p:grpSpPr>
+        <a:xfrm>
+          <a:off x="0" y="0"/>
+          <a:ext cx="0" cy="0"/>
+          <a:chOff x="0" y="0"/>
+          <a:chExt cx="0" cy="0"/>
+        </a:xfrm>
+      </p:grpSpPr>
+      <p:sp>
+        <p:nvSpPr>
+          <p:cNvPr id="5" name="Title 4">
+            <a:extLst>
+              <a:ext uri="{FF2B5EF4-FFF2-40B4-BE49-F238E27FC236}">
+                <a16:creationId xmlns:a16="http://schemas.microsoft.com/office/drawing/2014/main" id="{7465A86E-DF90-DB76-AB33-CA55E772835B}"/>
+              </a:ext>
+            </a:extLst>
+          </p:cNvPr>
+          <p:cNvSpPr>
+            <a:spLocks noGrp="1"/>
+          </p:cNvSpPr>
+          <p:nvPr>
+            <p:ph type="title"/>
+          </p:nvPr>
+        </p:nvSpPr>
+        <p:spPr/>
+        <p:txBody>
+          <a:bodyPr/>
+          <a:lstStyle/>
+          <a:p>
+            <a:r>
+              <a:rPr lang="en-CA" dirty="0"/>
+              <a:t>Questions?</a:t>
+            </a:r>
+          </a:p>
+        </p:txBody>
+      </p:sp>
+      <p:sp>
+        <p:nvSpPr>
+          <p:cNvPr id="4" name="Slide Number Placeholder 3">
+            <a:extLst>
+              <a:ext uri="{FF2B5EF4-FFF2-40B4-BE49-F238E27FC236}">
+                <a16:creationId xmlns:a16="http://schemas.microsoft.com/office/drawing/2014/main" id="{FD9E6229-00C6-9485-93D6-6EE66CE654D1}"/>
+              </a:ext>
+            </a:extLst>
+          </p:cNvPr>
+          <p:cNvSpPr>
+            <a:spLocks noGrp="1"/>
+          </p:cNvSpPr>
+          <p:nvPr>
+            <p:ph type="sldNum" sz="quarter" idx="4294967295"/>
+          </p:nvPr>
+        </p:nvSpPr>
+        <p:spPr>
+          <a:xfrm>
+            <a:off x="11610975" y="6489700"/>
+            <a:ext cx="581025" cy="365125"/>
+          </a:xfrm>
+        </p:spPr>
+        <p:txBody>
+          <a:bodyPr/>
+          <a:lstStyle/>
+          <a:p>
+            <a:fld id="{B6F15528-21DE-4FAA-801E-634DDDAF4B2B}" type="slidenum">
+              <a:rPr lang="en-CA" smtClean="0"/>
+              <a:t>22</a:t>
+            </a:fld>
+            <a:endParaRPr lang="en-CA"/>
+          </a:p>
+        </p:txBody>
+      </p:sp>
+    </p:spTree>
+    <p:extLst>
+      <p:ext uri="{BB962C8B-B14F-4D97-AF65-F5344CB8AC3E}">
+        <p14:creationId xmlns:p14="http://schemas.microsoft.com/office/powerpoint/2010/main" val="805596329"/>
       </p:ext>
     </p:extLst>
   </p:cSld>
@@ -7807,15 +8588,6 @@
 </file>
 
 <file path=customXml/item1.xml><?xml version="1.0" encoding="utf-8"?>
-<?mso-contentType ?>
-<FormTemplates xmlns="http://schemas.microsoft.com/sharepoint/v3/contenttype/forms">
-  <Display>DocumentLibraryForm</Display>
-  <Edit>DocumentLibraryForm</Edit>
-  <New>DocumentLibraryForm</New>
-</FormTemplates>
-</file>
-
-<file path=customXml/item2.xml><?xml version="1.0" encoding="utf-8"?>
 <p:properties xmlns:p="http://schemas.microsoft.com/office/2006/metadata/properties" xmlns:xsi="http://www.w3.org/2001/XMLSchema-instance" xmlns:pc="http://schemas.microsoft.com/office/infopath/2007/PartnerControls">
   <documentManagement>
     <SharedWithUsers xmlns="cf5a87e6-8225-499d-8aa7-664ff23f0528">
@@ -7871,6 +8643,15 @@
     </lcf76f155ced4ddcb4097134ff3c332f>
   </documentManagement>
 </p:properties>
+</file>
+
+<file path=customXml/item2.xml><?xml version="1.0" encoding="utf-8"?>
+<?mso-contentType ?>
+<FormTemplates xmlns="http://schemas.microsoft.com/sharepoint/v3/contenttype/forms">
+  <Display>DocumentLibraryForm</Display>
+  <Edit>DocumentLibraryForm</Edit>
+  <New>DocumentLibraryForm</New>
+</FormTemplates>
 </file>
 
 <file path=customXml/item3.xml><?xml version="1.0" encoding="utf-8"?>
@@ -8129,14 +8910,6 @@
 </file>
 
 <file path=customXml/itemProps1.xml><?xml version="1.0" encoding="utf-8"?>
-<ds:datastoreItem xmlns:ds="http://schemas.openxmlformats.org/officeDocument/2006/customXml" ds:itemID="{0BA6B2E7-CD55-478D-BEC8-4794A5943CF4}">
-  <ds:schemaRefs>
-    <ds:schemaRef ds:uri="http://schemas.microsoft.com/sharepoint/v3/contenttype/forms"/>
-  </ds:schemaRefs>
-</ds:datastoreItem>
-</file>
-
-<file path=customXml/itemProps2.xml><?xml version="1.0" encoding="utf-8"?>
 <ds:datastoreItem xmlns:ds="http://schemas.openxmlformats.org/officeDocument/2006/customXml" ds:itemID="{ABC3541C-51DD-43E3-8C9A-56AC6823A20C}">
   <ds:schemaRefs>
     <ds:schemaRef ds:uri="9f94fe76-4e69-4a06-93ce-361b54a8e543"/>
@@ -8149,6 +8922,14 @@
     <ds:schemaRef ds:uri="http://schemas.microsoft.com/office/infopath/2007/PartnerControls"/>
     <ds:schemaRef ds:uri="http://schemas.openxmlformats.org/package/2006/metadata/core-properties"/>
     <ds:schemaRef ds:uri="http://www.w3.org/XML/1998/namespace"/>
+  </ds:schemaRefs>
+</ds:datastoreItem>
+</file>
+
+<file path=customXml/itemProps2.xml><?xml version="1.0" encoding="utf-8"?>
+<ds:datastoreItem xmlns:ds="http://schemas.openxmlformats.org/officeDocument/2006/customXml" ds:itemID="{0BA6B2E7-CD55-478D-BEC8-4794A5943CF4}">
+  <ds:schemaRefs>
+    <ds:schemaRef ds:uri="http://schemas.microsoft.com/sharepoint/v3/contenttype/forms"/>
   </ds:schemaRefs>
 </ds:datastoreItem>
 </file>

</xml_diff>

<commit_message>
Updated the PAS slides to indicate order of priority
</commit_message>
<xml_diff>
--- a/presentations/2025-04-DaVinci/Event/Burden Reduction - Approach for Achieving Conformance.pptx
+++ b/presentations/2025-04-DaVinci/Event/Burden Reduction - Approach for Achieving Conformance.pptx
@@ -31,8 +31,8 @@
     <p:sldId id="277" r:id="rId25"/>
     <p:sldId id="273" r:id="rId26"/>
     <p:sldId id="274" r:id="rId27"/>
-    <p:sldId id="275" r:id="rId28"/>
-    <p:sldId id="276" r:id="rId29"/>
+    <p:sldId id="276" r:id="rId28"/>
+    <p:sldId id="275" r:id="rId29"/>
     <p:sldId id="267" r:id="rId30"/>
     <p:sldId id="266" r:id="rId31"/>
     <p:sldId id="269" r:id="rId32"/>
@@ -11204,7 +11204,7 @@
           <a:p>
             <a:r>
               <a:rPr lang="en-CA" dirty="0"/>
-              <a:t>PAS IG provides a means for EHRs to send authorization requests using FHIR that will be converted to X12 278.</a:t>
+              <a:t>PAS IG provides a means for EHRs to send authorization requests using FHIR that will normally be converted to X12 278.</a:t>
             </a:r>
           </a:p>
           <a:p>
@@ -11294,35 +11294,53 @@
           <a:bodyPr/>
           <a:lstStyle/>
           <a:p>
+            <a:pPr marL="457200" indent="-457200">
+              <a:buFont typeface="+mj-lt"/>
+              <a:buAutoNum type="arabicPeriod"/>
+            </a:pPr>
             <a:r>
               <a:rPr lang="en-US" dirty="0"/>
               <a:t>Support the $submit for the initial request</a:t>
             </a:r>
           </a:p>
           <a:p>
+            <a:pPr marL="457200" indent="-457200">
+              <a:buFont typeface="+mj-lt"/>
+              <a:buAutoNum type="arabicPeriod"/>
+            </a:pPr>
+            <a:r>
+              <a:rPr lang="en-US" dirty="0"/>
+              <a:t>Support Subscriptions to return update notifications to existing requests</a:t>
+            </a:r>
+          </a:p>
+          <a:p>
+            <a:pPr marL="457200" indent="-457200">
+              <a:buFont typeface="+mj-lt"/>
+              <a:buAutoNum type="arabicPeriod"/>
+            </a:pPr>
             <a:r>
               <a:rPr lang="en-US" dirty="0"/>
               <a:t>Support the $submit for updated requests</a:t>
             </a:r>
           </a:p>
           <a:p>
+            <a:pPr marL="457200" indent="-457200">
+              <a:buFont typeface="+mj-lt"/>
+              <a:buAutoNum type="arabicPeriod"/>
+            </a:pPr>
             <a:r>
               <a:rPr lang="en-US" dirty="0"/>
-              <a:t>Support Subscriptions to return update notifications to existing requests</a:t>
-            </a:r>
+              <a:t>Support $inquire to search for requests</a:t>
+            </a:r>
+          </a:p>
+          <a:p>
+            <a:endParaRPr lang="en-US" dirty="0"/>
           </a:p>
           <a:p>
             <a:r>
               <a:rPr lang="en-US" dirty="0"/>
-              <a:t>Support $inquire to search </a:t>
-            </a:r>
-            <a:r>
-              <a:rPr lang="en-US"/>
-              <a:t>for requests</a:t>
-            </a:r>
-          </a:p>
-          <a:p>
-            <a:endParaRPr lang="en-US"/>
+              <a:t>All four elements are required to support PAS.  The order given is priority hints for implementers.</a:t>
+            </a:r>
           </a:p>
         </p:txBody>
       </p:sp>
@@ -11710,7 +11728,7 @@
           <p:cNvPr id="2" name="Text Placeholder 1">
             <a:extLst>
               <a:ext uri="{FF2B5EF4-FFF2-40B4-BE49-F238E27FC236}">
-                <a16:creationId xmlns:a16="http://schemas.microsoft.com/office/drawing/2014/main" id="{1C813303-BD95-B0C9-85FE-98B75F95E295}"/>
+                <a16:creationId xmlns:a16="http://schemas.microsoft.com/office/drawing/2014/main" id="{8ED0F328-2538-C84D-D533-D3566C5F7960}"/>
               </a:ext>
             </a:extLst>
           </p:cNvPr>
@@ -11728,53 +11746,41 @@
           <a:p>
             <a:r>
               <a:rPr lang="en-US" dirty="0"/>
-              <a:t>Non-Submitting systems are not able to subscribe to Prior Authorizations.</a:t>
-            </a:r>
-          </a:p>
-          <a:p>
+              <a:t>In some cases, the prior authorization needs to be updated after the request was submitted:</a:t>
+            </a:r>
+          </a:p>
+          <a:p>
+            <a:pPr lvl="1"/>
             <a:r>
               <a:rPr lang="en-US" dirty="0"/>
-              <a:t>There is a use case for non-submitting systems to find out about prior authorizations.</a:t>
-            </a:r>
-          </a:p>
-          <a:p>
+              <a:t>Change to the services needed</a:t>
+            </a:r>
+          </a:p>
+          <a:p>
+            <a:pPr lvl="1"/>
             <a:r>
               <a:rPr lang="en-US" dirty="0"/>
-              <a:t>The $inquire operation supports searching for authorizations by example.</a:t>
-            </a:r>
-          </a:p>
-          <a:p>
+              <a:t>Timeframe over which the service is provided</a:t>
+            </a:r>
+          </a:p>
+          <a:p>
+            <a:pPr lvl="1"/>
             <a:r>
               <a:rPr lang="en-US" dirty="0"/>
-              <a:t>The incoming parameter is a FHIR Claim Inquiry Bundle which provides the items intended to match existing authorization requests:</a:t>
+              <a:t>Quantity of service or product</a:t>
             </a:r>
           </a:p>
           <a:p>
             <a:pPr lvl="1"/>
             <a:r>
               <a:rPr lang="en-US" dirty="0"/>
-              <a:t>Requesting provider organization</a:t>
-            </a:r>
-          </a:p>
-          <a:p>
-            <a:pPr lvl="1"/>
+              <a:t>Elimination of the need for a given service</a:t>
+            </a:r>
+          </a:p>
+          <a:p>
             <a:r>
               <a:rPr lang="en-US" dirty="0"/>
-              <a:t>Payer organization</a:t>
-            </a:r>
-          </a:p>
-          <a:p>
-            <a:pPr lvl="1"/>
-            <a:r>
-              <a:rPr lang="en-US" dirty="0"/>
-              <a:t>Patient</a:t>
-            </a:r>
-          </a:p>
-          <a:p>
-            <a:pPr lvl="1"/>
-            <a:r>
-              <a:rPr lang="en-US" dirty="0"/>
-              <a:t>Other fields as needed</a:t>
+              <a:t>A FHIR Claim Update request bundle is submitted with the $submit operation.  This bundle is converted into an X12 278 update.</a:t>
             </a:r>
           </a:p>
         </p:txBody>
@@ -11784,7 +11790,7 @@
           <p:cNvPr id="3" name="Title 2">
             <a:extLst>
               <a:ext uri="{FF2B5EF4-FFF2-40B4-BE49-F238E27FC236}">
-                <a16:creationId xmlns:a16="http://schemas.microsoft.com/office/drawing/2014/main" id="{9EADEA4A-A7AB-45F9-B483-35B4F8224732}"/>
+                <a16:creationId xmlns:a16="http://schemas.microsoft.com/office/drawing/2014/main" id="{32742139-24DE-683D-2CF0-EC279DBFC8A2}"/>
               </a:ext>
             </a:extLst>
           </p:cNvPr>
@@ -11802,7 +11808,7 @@
           <a:p>
             <a:r>
               <a:rPr lang="en-US" dirty="0"/>
-              <a:t>Prior Authorization Inquiries</a:t>
+              <a:t>Prior Authorization Updates</a:t>
             </a:r>
           </a:p>
         </p:txBody>
@@ -11812,7 +11818,7 @@
           <p:cNvPr id="4" name="Slide Number Placeholder 3">
             <a:extLst>
               <a:ext uri="{FF2B5EF4-FFF2-40B4-BE49-F238E27FC236}">
-                <a16:creationId xmlns:a16="http://schemas.microsoft.com/office/drawing/2014/main" id="{3AEB1BB1-3A67-4C42-BBBB-019C7DD5CE37}"/>
+                <a16:creationId xmlns:a16="http://schemas.microsoft.com/office/drawing/2014/main" id="{9028E8F4-65EE-1C76-5345-B864EADA4AA2}"/>
               </a:ext>
             </a:extLst>
           </p:cNvPr>
@@ -11839,7 +11845,7 @@
     </p:spTree>
     <p:extLst>
       <p:ext uri="{BB962C8B-B14F-4D97-AF65-F5344CB8AC3E}">
-        <p14:creationId xmlns:p14="http://schemas.microsoft.com/office/powerpoint/2010/main" val="3564063120"/>
+        <p14:creationId xmlns:p14="http://schemas.microsoft.com/office/powerpoint/2010/main" val="1155457930"/>
       </p:ext>
     </p:extLst>
   </p:cSld>
@@ -11871,7 +11877,7 @@
           <p:cNvPr id="2" name="Text Placeholder 1">
             <a:extLst>
               <a:ext uri="{FF2B5EF4-FFF2-40B4-BE49-F238E27FC236}">
-                <a16:creationId xmlns:a16="http://schemas.microsoft.com/office/drawing/2014/main" id="{8ED0F328-2538-C84D-D533-D3566C5F7960}"/>
+                <a16:creationId xmlns:a16="http://schemas.microsoft.com/office/drawing/2014/main" id="{1C813303-BD95-B0C9-85FE-98B75F95E295}"/>
               </a:ext>
             </a:extLst>
           </p:cNvPr>
@@ -11889,41 +11895,53 @@
           <a:p>
             <a:r>
               <a:rPr lang="en-US" dirty="0"/>
-              <a:t>In some cases, the prior authorization needs to be updated after the request was submitted:</a:t>
+              <a:t>Non-Submitting systems are not able to subscribe to Prior Authorizations.</a:t>
+            </a:r>
+          </a:p>
+          <a:p>
+            <a:r>
+              <a:rPr lang="en-US" dirty="0"/>
+              <a:t>There is a use case for non-submitting systems to find out about prior authorizations.</a:t>
+            </a:r>
+          </a:p>
+          <a:p>
+            <a:r>
+              <a:rPr lang="en-US" dirty="0"/>
+              <a:t>The $inquire operation supports searching for authorizations by example.</a:t>
+            </a:r>
+          </a:p>
+          <a:p>
+            <a:r>
+              <a:rPr lang="en-US" dirty="0"/>
+              <a:t>The incoming parameter is a FHIR Claim Inquiry Bundle which provides the items intended to match existing authorization requests:</a:t>
             </a:r>
           </a:p>
           <a:p>
             <a:pPr lvl="1"/>
             <a:r>
               <a:rPr lang="en-US" dirty="0"/>
-              <a:t>Change to the services needed</a:t>
+              <a:t>Requesting provider organization</a:t>
             </a:r>
           </a:p>
           <a:p>
             <a:pPr lvl="1"/>
             <a:r>
               <a:rPr lang="en-US" dirty="0"/>
-              <a:t>Timeframe over which the service is provided</a:t>
+              <a:t>Payer organization</a:t>
             </a:r>
           </a:p>
           <a:p>
             <a:pPr lvl="1"/>
             <a:r>
               <a:rPr lang="en-US" dirty="0"/>
-              <a:t>Quantity of service or product</a:t>
+              <a:t>Patient</a:t>
             </a:r>
           </a:p>
           <a:p>
             <a:pPr lvl="1"/>
             <a:r>
               <a:rPr lang="en-US" dirty="0"/>
-              <a:t>Elimination of the need for a given service</a:t>
-            </a:r>
-          </a:p>
-          <a:p>
-            <a:r>
-              <a:rPr lang="en-US" dirty="0"/>
-              <a:t>A FHIR Claim Update request bundle is submitted with the $submit operation.  This bundle is converted into an X12 278 update.</a:t>
+              <a:t>Other fields as needed</a:t>
             </a:r>
           </a:p>
         </p:txBody>
@@ -11933,7 +11951,7 @@
           <p:cNvPr id="3" name="Title 2">
             <a:extLst>
               <a:ext uri="{FF2B5EF4-FFF2-40B4-BE49-F238E27FC236}">
-                <a16:creationId xmlns:a16="http://schemas.microsoft.com/office/drawing/2014/main" id="{32742139-24DE-683D-2CF0-EC279DBFC8A2}"/>
+                <a16:creationId xmlns:a16="http://schemas.microsoft.com/office/drawing/2014/main" id="{9EADEA4A-A7AB-45F9-B483-35B4F8224732}"/>
               </a:ext>
             </a:extLst>
           </p:cNvPr>
@@ -11951,7 +11969,7 @@
           <a:p>
             <a:r>
               <a:rPr lang="en-US" dirty="0"/>
-              <a:t>Prior Authorization Updates</a:t>
+              <a:t>Prior Authorization Inquiries</a:t>
             </a:r>
           </a:p>
         </p:txBody>
@@ -11961,7 +11979,7 @@
           <p:cNvPr id="4" name="Slide Number Placeholder 3">
             <a:extLst>
               <a:ext uri="{FF2B5EF4-FFF2-40B4-BE49-F238E27FC236}">
-                <a16:creationId xmlns:a16="http://schemas.microsoft.com/office/drawing/2014/main" id="{9028E8F4-65EE-1C76-5345-B864EADA4AA2}"/>
+                <a16:creationId xmlns:a16="http://schemas.microsoft.com/office/drawing/2014/main" id="{3AEB1BB1-3A67-4C42-BBBB-019C7DD5CE37}"/>
               </a:ext>
             </a:extLst>
           </p:cNvPr>
@@ -11988,7 +12006,7 @@
     </p:spTree>
     <p:extLst>
       <p:ext uri="{BB962C8B-B14F-4D97-AF65-F5344CB8AC3E}">
-        <p14:creationId xmlns:p14="http://schemas.microsoft.com/office/powerpoint/2010/main" val="1155457930"/>
+        <p14:creationId xmlns:p14="http://schemas.microsoft.com/office/powerpoint/2010/main" val="3564063120"/>
       </p:ext>
     </p:extLst>
   </p:cSld>
@@ -13985,6 +14003,15 @@
 </file>
 
 <file path=customXml/item1.xml><?xml version="1.0" encoding="utf-8"?>
+<?mso-contentType ?>
+<FormTemplates xmlns="http://schemas.microsoft.com/sharepoint/v3/contenttype/forms">
+  <Display>DocumentLibraryForm</Display>
+  <Edit>DocumentLibraryForm</Edit>
+  <New>DocumentLibraryForm</New>
+</FormTemplates>
+</file>
+
+<file path=customXml/item2.xml><?xml version="1.0" encoding="utf-8"?>
 <ct:contentTypeSchema xmlns:ct="http://schemas.microsoft.com/office/2006/metadata/contentType" xmlns:ma="http://schemas.microsoft.com/office/2006/metadata/properties/metaAttributes" ct:_="" ma:_="" ma:contentTypeName="Document" ma:contentTypeID="0x0101002C8FC9818E7A2340A2B524F46111FD15" ma:contentTypeVersion="19" ma:contentTypeDescription="Create a new document." ma:contentTypeScope="" ma:versionID="7ef9a8bc46a14bfd553da3a3e6695c4d">
   <xsd:schema xmlns:xsd="http://www.w3.org/2001/XMLSchema" xmlns:xs="http://www.w3.org/2001/XMLSchema" xmlns:p="http://schemas.microsoft.com/office/2006/metadata/properties" xmlns:ns2="9f94fe76-4e69-4a06-93ce-361b54a8e543" xmlns:ns3="cf5a87e6-8225-499d-8aa7-664ff23f0528" targetNamespace="http://schemas.microsoft.com/office/2006/metadata/properties" ma:root="true" ma:fieldsID="580938c8cdc1ed620302479102261575" ns2:_="" ns3:_="">
     <xsd:import namespace="9f94fe76-4e69-4a06-93ce-361b54a8e543"/>
@@ -14239,15 +14266,6 @@
 </ct:contentTypeSchema>
 </file>
 
-<file path=customXml/item2.xml><?xml version="1.0" encoding="utf-8"?>
-<?mso-contentType ?>
-<FormTemplates xmlns="http://schemas.microsoft.com/sharepoint/v3/contenttype/forms">
-  <Display>DocumentLibraryForm</Display>
-  <Edit>DocumentLibraryForm</Edit>
-  <New>DocumentLibraryForm</New>
-</FormTemplates>
-</file>
-
 <file path=customXml/item3.xml><?xml version="1.0" encoding="utf-8"?>
 <p:properties xmlns:p="http://schemas.microsoft.com/office/2006/metadata/properties" xmlns:xsi="http://www.w3.org/2001/XMLSchema-instance" xmlns:pc="http://schemas.microsoft.com/office/infopath/2007/PartnerControls">
   <documentManagement>
@@ -14307,6 +14325,14 @@
 </file>
 
 <file path=customXml/itemProps1.xml><?xml version="1.0" encoding="utf-8"?>
+<ds:datastoreItem xmlns:ds="http://schemas.openxmlformats.org/officeDocument/2006/customXml" ds:itemID="{0BA6B2E7-CD55-478D-BEC8-4794A5943CF4}">
+  <ds:schemaRefs>
+    <ds:schemaRef ds:uri="http://schemas.microsoft.com/sharepoint/v3/contenttype/forms"/>
+  </ds:schemaRefs>
+</ds:datastoreItem>
+</file>
+
+<file path=customXml/itemProps2.xml><?xml version="1.0" encoding="utf-8"?>
 <ds:datastoreItem xmlns:ds="http://schemas.openxmlformats.org/officeDocument/2006/customXml" ds:itemID="{75D6C950-6891-4B9F-8042-EAAA803A1D70}">
   <ds:schemaRefs>
     <ds:schemaRef ds:uri="9f94fe76-4e69-4a06-93ce-361b54a8e543"/>
@@ -14321,14 +14347,6 @@
     <ds:schemaRef ds:uri="http://schemas.microsoft.com/office/infopath/2007/PartnerControls"/>
     <ds:schemaRef ds:uri="http://schemas.openxmlformats.org/package/2006/metadata/core-properties"/>
     <ds:schemaRef ds:uri="http://www.w3.org/2001/XMLSchema"/>
-  </ds:schemaRefs>
-</ds:datastoreItem>
-</file>
-
-<file path=customXml/itemProps2.xml><?xml version="1.0" encoding="utf-8"?>
-<ds:datastoreItem xmlns:ds="http://schemas.openxmlformats.org/officeDocument/2006/customXml" ds:itemID="{0BA6B2E7-CD55-478D-BEC8-4794A5943CF4}">
-  <ds:schemaRefs>
-    <ds:schemaRef ds:uri="http://schemas.microsoft.com/sharepoint/v3/contenttype/forms"/>
   </ds:schemaRefs>
 </ds:datastoreItem>
 </file>

</xml_diff>